<commit_message>
edit findevent sequence diagram
</commit_message>
<xml_diff>
--- a/docs/diagrams/FindEventCommandSequenceDiagram.pptx
+++ b/docs/diagrams/FindEventCommandSequenceDiagram.pptx
@@ -208,7 +208,7 @@
           <a:p>
             <a:fld id="{F5CC4B3F-88C1-4FFA-B1B6-F41C21DC6924}" type="datetimeFigureOut">
               <a:rPr lang="en-US" smtClean="0"/>
-              <a:t>4/14/18</a:t>
+              <a:t>4/15/18</a:t>
             </a:fld>
             <a:endParaRPr lang="en-US"/>
           </a:p>
@@ -654,7 +654,7 @@
           <a:p>
             <a:fld id="{78C97017-6FC3-485B-9764-EAC9E56C1D49}" type="datetimeFigureOut">
               <a:rPr lang="en-US" smtClean="0"/>
-              <a:t>4/14/18</a:t>
+              <a:t>4/15/18</a:t>
             </a:fld>
             <a:endParaRPr lang="en-US"/>
           </a:p>
@@ -822,7 +822,7 @@
           <a:p>
             <a:fld id="{78C97017-6FC3-485B-9764-EAC9E56C1D49}" type="datetimeFigureOut">
               <a:rPr lang="en-US" smtClean="0"/>
-              <a:t>4/14/18</a:t>
+              <a:t>4/15/18</a:t>
             </a:fld>
             <a:endParaRPr lang="en-US"/>
           </a:p>
@@ -1000,7 +1000,7 @@
           <a:p>
             <a:fld id="{78C97017-6FC3-485B-9764-EAC9E56C1D49}" type="datetimeFigureOut">
               <a:rPr lang="en-US" smtClean="0"/>
-              <a:t>4/14/18</a:t>
+              <a:t>4/15/18</a:t>
             </a:fld>
             <a:endParaRPr lang="en-US"/>
           </a:p>
@@ -1168,7 +1168,7 @@
           <a:p>
             <a:fld id="{78C97017-6FC3-485B-9764-EAC9E56C1D49}" type="datetimeFigureOut">
               <a:rPr lang="en-US" smtClean="0"/>
-              <a:t>4/14/18</a:t>
+              <a:t>4/15/18</a:t>
             </a:fld>
             <a:endParaRPr lang="en-US"/>
           </a:p>
@@ -1413,7 +1413,7 @@
           <a:p>
             <a:fld id="{78C97017-6FC3-485B-9764-EAC9E56C1D49}" type="datetimeFigureOut">
               <a:rPr lang="en-US" smtClean="0"/>
-              <a:t>4/14/18</a:t>
+              <a:t>4/15/18</a:t>
             </a:fld>
             <a:endParaRPr lang="en-US"/>
           </a:p>
@@ -1698,7 +1698,7 @@
           <a:p>
             <a:fld id="{78C97017-6FC3-485B-9764-EAC9E56C1D49}" type="datetimeFigureOut">
               <a:rPr lang="en-US" smtClean="0"/>
-              <a:t>4/14/18</a:t>
+              <a:t>4/15/18</a:t>
             </a:fld>
             <a:endParaRPr lang="en-US"/>
           </a:p>
@@ -2117,7 +2117,7 @@
           <a:p>
             <a:fld id="{78C97017-6FC3-485B-9764-EAC9E56C1D49}" type="datetimeFigureOut">
               <a:rPr lang="en-US" smtClean="0"/>
-              <a:t>4/14/18</a:t>
+              <a:t>4/15/18</a:t>
             </a:fld>
             <a:endParaRPr lang="en-US"/>
           </a:p>
@@ -2234,7 +2234,7 @@
           <a:p>
             <a:fld id="{78C97017-6FC3-485B-9764-EAC9E56C1D49}" type="datetimeFigureOut">
               <a:rPr lang="en-US" smtClean="0"/>
-              <a:t>4/14/18</a:t>
+              <a:t>4/15/18</a:t>
             </a:fld>
             <a:endParaRPr lang="en-US"/>
           </a:p>
@@ -2329,7 +2329,7 @@
           <a:p>
             <a:fld id="{78C97017-6FC3-485B-9764-EAC9E56C1D49}" type="datetimeFigureOut">
               <a:rPr lang="en-US" smtClean="0"/>
-              <a:t>4/14/18</a:t>
+              <a:t>4/15/18</a:t>
             </a:fld>
             <a:endParaRPr lang="en-US"/>
           </a:p>
@@ -2604,7 +2604,7 @@
           <a:p>
             <a:fld id="{78C97017-6FC3-485B-9764-EAC9E56C1D49}" type="datetimeFigureOut">
               <a:rPr lang="en-US" smtClean="0"/>
-              <a:t>4/14/18</a:t>
+              <a:t>4/15/18</a:t>
             </a:fld>
             <a:endParaRPr lang="en-US"/>
           </a:p>
@@ -2856,7 +2856,7 @@
           <a:p>
             <a:fld id="{78C97017-6FC3-485B-9764-EAC9E56C1D49}" type="datetimeFigureOut">
               <a:rPr lang="en-US" smtClean="0"/>
-              <a:t>4/14/18</a:t>
+              <a:t>4/15/18</a:t>
             </a:fld>
             <a:endParaRPr lang="en-US"/>
           </a:p>
@@ -3067,7 +3067,7 @@
           <a:p>
             <a:fld id="{78C97017-6FC3-485B-9764-EAC9E56C1D49}" type="datetimeFigureOut">
               <a:rPr lang="en-US" smtClean="0"/>
-              <a:t>4/14/18</a:t>
+              <a:t>4/15/18</a:t>
             </a:fld>
             <a:endParaRPr lang="en-US"/>
           </a:p>
@@ -3573,13 +3573,15 @@
       <p:cxnSp>
         <p:nvCxnSpPr>
           <p:cNvPr id="5" name="Straight Connector 4"/>
-          <p:cNvCxnSpPr/>
+          <p:cNvCxnSpPr>
+            <a:cxnSpLocks/>
+          </p:cNvCxnSpPr>
           <p:nvPr/>
         </p:nvCxnSpPr>
         <p:spPr>
           <a:xfrm>
             <a:off x="1851454" y="1220997"/>
-            <a:ext cx="0" cy="2703280"/>
+            <a:ext cx="0" cy="3408153"/>
           </a:xfrm>
           <a:prstGeom prst="line">
             <a:avLst/>
@@ -3849,12 +3851,12 @@
           <a:p>
             <a:pPr algn="ctr"/>
             <a:r>
-              <a:rPr lang="en-US" sz="1600" dirty="0" err="1">
+              <a:rPr lang="en-US" sz="1600">
                 <a:solidFill>
                   <a:schemeClr val="bg1"/>
                 </a:solidFill>
               </a:rPr>
-              <a:t>d:</a:t>
+              <a:t>:</a:t>
             </a:r>
             <a:r>
               <a:rPr lang="en-US" altLang="zh-Hans" sz="1600" dirty="0" err="1">

</xml_diff>